<commit_message>
updated slides to include issues that came up in discussion: spoofing, doubles not floats, remote desktop
</commit_message>
<xml_diff>
--- a/week1/week1_JZ.pptx
+++ b/week1/week1_JZ.pptx
@@ -13,12 +13,12 @@
     <p:sldId id="260" r:id="rId4"/>
     <p:sldId id="262" r:id="rId5"/>
     <p:sldId id="258" r:id="rId6"/>
-    <p:sldId id="259" r:id="rId7"/>
-    <p:sldId id="263" r:id="rId8"/>
-    <p:sldId id="266" r:id="rId9"/>
-    <p:sldId id="265" r:id="rId10"/>
-    <p:sldId id="261" r:id="rId11"/>
-    <p:sldId id="264" r:id="rId12"/>
+    <p:sldId id="268" r:id="rId7"/>
+    <p:sldId id="266" r:id="rId8"/>
+    <p:sldId id="259" r:id="rId9"/>
+    <p:sldId id="267" r:id="rId10"/>
+    <p:sldId id="265" r:id="rId11"/>
+    <p:sldId id="261" r:id="rId12"/>
   </p:sldIdLst>
   <p:sldSz cx="12192000" cy="6858000"/>
   <p:notesSz cx="6858000" cy="9144000"/>
@@ -219,7 +219,7 @@
           <a:p>
             <a:fld id="{267DF66C-789E-9B44-A9F5-DFBF68F9D18E}" type="datetimeFigureOut">
               <a:rPr lang="en-US" smtClean="0"/>
-              <a:t>10/4/18</a:t>
+              <a:t>10/5/18</a:t>
             </a:fld>
             <a:endParaRPr lang="en-US"/>
           </a:p>
@@ -638,7 +638,7 @@
           <a:p>
             <a:fld id="{CDB9F987-BC23-B549-9DCC-292DC84ED715}" type="slidenum">
               <a:rPr lang="en-US" smtClean="0"/>
-              <a:t>5</a:t>
+              <a:t>3</a:t>
             </a:fld>
             <a:endParaRPr lang="en-US"/>
           </a:p>
@@ -647,7 +647,7 @@
     </p:spTree>
     <p:extLst>
       <p:ext uri="{BB962C8B-B14F-4D97-AF65-F5344CB8AC3E}">
-        <p14:creationId xmlns:p14="http://schemas.microsoft.com/office/powerpoint/2010/main" val="1603037059"/>
+        <p14:creationId xmlns:p14="http://schemas.microsoft.com/office/powerpoint/2010/main" val="3749289373"/>
       </p:ext>
     </p:extLst>
   </p:cSld>
@@ -701,230 +701,6 @@
           <a:bodyPr/>
           <a:lstStyle/>
           <a:p>
-            <a:r>
-              <a:rPr lang="en-US" dirty="0" err="1"/>
-              <a:t>Scp</a:t>
-            </a:r>
-            <a:r>
-              <a:rPr lang="en-US" dirty="0"/>
-              <a:t> (“secure copy protocol”) sends files from one computer to another</a:t>
-            </a:r>
-          </a:p>
-          <a:p>
-            <a:r>
-              <a:rPr lang="en-US" dirty="0"/>
-              <a:t>	</a:t>
-            </a:r>
-            <a:r>
-              <a:rPr lang="en-US" dirty="0" err="1"/>
-              <a:t>scp</a:t>
-            </a:r>
-            <a:r>
-              <a:rPr lang="en-US" dirty="0"/>
-              <a:t> &lt;location of file on local computer&gt; &lt;username&gt;@cs31.seas.ucla.edu:&lt;location where you want to put the file on seas computer&gt;</a:t>
-            </a:r>
-          </a:p>
-          <a:p>
-            <a:endParaRPr lang="en-US" dirty="0"/>
-          </a:p>
-          <a:p>
-            <a:r>
-              <a:rPr lang="en-US" dirty="0" err="1"/>
-              <a:t>Ssh</a:t>
-            </a:r>
-            <a:r>
-              <a:rPr lang="en-US" dirty="0"/>
-              <a:t> command used to log into seas computer remotely (must be done on UCLA network)</a:t>
-            </a:r>
-          </a:p>
-          <a:p>
-            <a:endParaRPr lang="en-US" dirty="0"/>
-          </a:p>
-          <a:p>
-            <a:r>
-              <a:rPr lang="en-US" dirty="0"/>
-              <a:t>If there is an error when doing “ls ~/Desktop”, go to Seas help desk to fix account</a:t>
-            </a:r>
-          </a:p>
-          <a:p>
-            <a:endParaRPr lang="en-US" dirty="0"/>
-          </a:p>
-          <a:p>
-            <a:r>
-              <a:rPr lang="en-US" dirty="0"/>
-              <a:t>If there is a weird DNS spoofing warning when using </a:t>
-            </a:r>
-            <a:r>
-              <a:rPr lang="en-US" dirty="0" err="1"/>
-              <a:t>scp</a:t>
-            </a:r>
-            <a:r>
-              <a:rPr lang="en-US" dirty="0"/>
-              <a:t> or </a:t>
-            </a:r>
-            <a:r>
-              <a:rPr lang="en-US" dirty="0" err="1"/>
-              <a:t>ssh</a:t>
-            </a:r>
-            <a:r>
-              <a:rPr lang="en-US" dirty="0"/>
-              <a:t>, try:</a:t>
-            </a:r>
-          </a:p>
-          <a:p>
-            <a:pPr marL="228600" indent="-228600">
-              <a:buAutoNum type="arabicParenR"/>
-            </a:pPr>
-            <a:r>
-              <a:rPr lang="en-US" sz="1200" b="0" i="0" kern="1200" dirty="0">
-                <a:solidFill>
-                  <a:schemeClr val="tx1"/>
-                </a:solidFill>
-                <a:effectLst/>
-                <a:latin typeface="+mn-lt"/>
-                <a:ea typeface="+mn-ea"/>
-                <a:cs typeface="+mn-cs"/>
-              </a:rPr>
-              <a:t> </a:t>
-            </a:r>
-            <a:r>
-              <a:rPr lang="en-US" dirty="0" err="1"/>
-              <a:t>ssh</a:t>
-            </a:r>
-            <a:r>
-              <a:rPr lang="en-US" dirty="0"/>
-              <a:t> </a:t>
-            </a:r>
-            <a:r>
-              <a:rPr lang="en-US" i="1" dirty="0"/>
-              <a:t>yourSEASaccount</a:t>
-            </a:r>
-            <a:r>
-              <a:rPr lang="en-US" dirty="0"/>
-              <a:t>@cs31.seas.ucla.edu date ; </a:t>
-            </a:r>
-            <a:r>
-              <a:rPr lang="en-US" sz="1200" b="0" i="0" kern="1200" dirty="0">
-                <a:solidFill>
-                  <a:schemeClr val="tx1"/>
-                </a:solidFill>
-                <a:effectLst/>
-                <a:latin typeface="+mn-lt"/>
-                <a:ea typeface="+mn-ea"/>
-                <a:cs typeface="+mn-cs"/>
-              </a:rPr>
-              <a:t> </a:t>
-            </a:r>
-            <a:r>
-              <a:rPr lang="en-US" dirty="0" err="1"/>
-              <a:t>ssh</a:t>
-            </a:r>
-            <a:r>
-              <a:rPr lang="en-US" dirty="0"/>
-              <a:t> </a:t>
-            </a:r>
-            <a:r>
-              <a:rPr lang="en-US" i="1" dirty="0"/>
-              <a:t>yourSEASaccount</a:t>
-            </a:r>
-            <a:r>
-              <a:rPr lang="en-US" dirty="0"/>
-              <a:t>@cs31.seas.ucla.edu </a:t>
-            </a:r>
-          </a:p>
-          <a:p>
-            <a:pPr marL="228600" marR="0" lvl="0" indent="-228600" algn="l" defTabSz="914400" rtl="0" eaLnBrk="1" fontAlgn="auto" latinLnBrk="0" hangingPunct="1">
-              <a:lnSpc>
-                <a:spcPct val="100000"/>
-              </a:lnSpc>
-              <a:spcBef>
-                <a:spcPts val="0"/>
-              </a:spcBef>
-              <a:spcAft>
-                <a:spcPts val="0"/>
-              </a:spcAft>
-              <a:buClrTx/>
-              <a:buSzTx/>
-              <a:buFontTx/>
-              <a:buAutoNum type="arabicParenR"/>
-              <a:tabLst/>
-              <a:defRPr/>
-            </a:pPr>
-            <a:r>
-              <a:rPr lang="en-US" dirty="0"/>
-              <a:t>Remove cs31 line from ~/</a:t>
-            </a:r>
-            <a:r>
-              <a:rPr lang="en-US" sz="1200" kern="1200" dirty="0">
-                <a:solidFill>
-                  <a:schemeClr val="tx1"/>
-                </a:solidFill>
-                <a:effectLst/>
-                <a:latin typeface="+mn-lt"/>
-                <a:ea typeface="+mn-ea"/>
-                <a:cs typeface="+mn-cs"/>
-              </a:rPr>
-              <a:t>.</a:t>
-            </a:r>
-            <a:r>
-              <a:rPr lang="en-US" sz="1200" kern="1200" dirty="0" err="1">
-                <a:solidFill>
-                  <a:schemeClr val="tx1"/>
-                </a:solidFill>
-                <a:effectLst/>
-                <a:latin typeface="+mn-lt"/>
-                <a:ea typeface="+mn-ea"/>
-                <a:cs typeface="+mn-cs"/>
-              </a:rPr>
-              <a:t>ssh</a:t>
-            </a:r>
-            <a:r>
-              <a:rPr lang="en-US" sz="1200" kern="1200" dirty="0">
-                <a:solidFill>
-                  <a:schemeClr val="tx1"/>
-                </a:solidFill>
-                <a:effectLst/>
-                <a:latin typeface="+mn-lt"/>
-                <a:ea typeface="+mn-ea"/>
-                <a:cs typeface="+mn-cs"/>
-              </a:rPr>
-              <a:t>/</a:t>
-            </a:r>
-            <a:r>
-              <a:rPr lang="en-US" sz="1200" kern="1200" dirty="0" err="1">
-                <a:solidFill>
-                  <a:schemeClr val="tx1"/>
-                </a:solidFill>
-                <a:effectLst/>
-                <a:latin typeface="+mn-lt"/>
-                <a:ea typeface="+mn-ea"/>
-                <a:cs typeface="+mn-cs"/>
-              </a:rPr>
-              <a:t>known_hosts</a:t>
-            </a:r>
-            <a:r>
-              <a:rPr lang="en-US" sz="1200" kern="1200" dirty="0">
-                <a:solidFill>
-                  <a:schemeClr val="tx1"/>
-                </a:solidFill>
-                <a:effectLst/>
-                <a:latin typeface="+mn-lt"/>
-                <a:ea typeface="+mn-ea"/>
-                <a:cs typeface="+mn-cs"/>
-              </a:rPr>
-              <a:t> </a:t>
-            </a:r>
-          </a:p>
-          <a:p>
-            <a:pPr marL="228600" indent="-228600">
-              <a:buAutoNum type="arabicParenR"/>
-            </a:pPr>
-            <a:endParaRPr lang="en-US" dirty="0"/>
-          </a:p>
-          <a:p>
-            <a:pPr marL="228600" indent="-228600">
-              <a:buAutoNum type="arabicParenR"/>
-            </a:pPr>
             <a:endParaRPr lang="en-US" dirty="0"/>
           </a:p>
         </p:txBody>
@@ -946,7 +722,7 @@
           <a:p>
             <a:fld id="{CDB9F987-BC23-B549-9DCC-292DC84ED715}" type="slidenum">
               <a:rPr lang="en-US" smtClean="0"/>
-              <a:t>6</a:t>
+              <a:t>4</a:t>
             </a:fld>
             <a:endParaRPr lang="en-US"/>
           </a:p>
@@ -955,7 +731,7 @@
     </p:spTree>
     <p:extLst>
       <p:ext uri="{BB962C8B-B14F-4D97-AF65-F5344CB8AC3E}">
-        <p14:creationId xmlns:p14="http://schemas.microsoft.com/office/powerpoint/2010/main" val="4151812427"/>
+        <p14:creationId xmlns:p14="http://schemas.microsoft.com/office/powerpoint/2010/main" val="1221965568"/>
       </p:ext>
     </p:extLst>
   </p:cSld>
@@ -1009,10 +785,264 @@
           <a:bodyPr/>
           <a:lstStyle/>
           <a:p>
-            <a:r>
-              <a:rPr lang="en-US" dirty="0"/>
-              <a:t>Maybe mention that they can make bash alias</a:t>
-            </a:r>
+            <a:endParaRPr lang="en-US" dirty="0"/>
+          </a:p>
+        </p:txBody>
+      </p:sp>
+      <p:sp>
+        <p:nvSpPr>
+          <p:cNvPr id="4" name="Slide Number Placeholder 3"/>
+          <p:cNvSpPr>
+            <a:spLocks noGrp="1"/>
+          </p:cNvSpPr>
+          <p:nvPr>
+            <p:ph type="sldNum" sz="quarter" idx="5"/>
+          </p:nvPr>
+        </p:nvSpPr>
+        <p:spPr/>
+        <p:txBody>
+          <a:bodyPr/>
+          <a:lstStyle/>
+          <a:p>
+            <a:fld id="{CDB9F987-BC23-B549-9DCC-292DC84ED715}" type="slidenum">
+              <a:rPr lang="en-US" smtClean="0"/>
+              <a:t>5</a:t>
+            </a:fld>
+            <a:endParaRPr lang="en-US"/>
+          </a:p>
+        </p:txBody>
+      </p:sp>
+    </p:spTree>
+    <p:extLst>
+      <p:ext uri="{BB962C8B-B14F-4D97-AF65-F5344CB8AC3E}">
+        <p14:creationId xmlns:p14="http://schemas.microsoft.com/office/powerpoint/2010/main" val="1603037059"/>
+      </p:ext>
+    </p:extLst>
+  </p:cSld>
+  <p:clrMapOvr>
+    <a:masterClrMapping/>
+  </p:clrMapOvr>
+</p:notes>
+</file>
+
+<file path=ppt/notesSlides/notesSlide5.xml><?xml version="1.0" encoding="utf-8"?>
+<p:notes xmlns:a="http://schemas.openxmlformats.org/drawingml/2006/main" xmlns:r="http://schemas.openxmlformats.org/officeDocument/2006/relationships" xmlns:p="http://schemas.openxmlformats.org/presentationml/2006/main">
+  <p:cSld>
+    <p:spTree>
+      <p:nvGrpSpPr>
+        <p:cNvPr id="1" name=""/>
+        <p:cNvGrpSpPr/>
+        <p:nvPr/>
+      </p:nvGrpSpPr>
+      <p:grpSpPr>
+        <a:xfrm>
+          <a:off x="0" y="0"/>
+          <a:ext cx="0" cy="0"/>
+          <a:chOff x="0" y="0"/>
+          <a:chExt cx="0" cy="0"/>
+        </a:xfrm>
+      </p:grpSpPr>
+      <p:sp>
+        <p:nvSpPr>
+          <p:cNvPr id="2" name="Slide Image Placeholder 1"/>
+          <p:cNvSpPr>
+            <a:spLocks noGrp="1" noRot="1" noChangeAspect="1"/>
+          </p:cNvSpPr>
+          <p:nvPr>
+            <p:ph type="sldImg"/>
+          </p:nvPr>
+        </p:nvSpPr>
+        <p:spPr/>
+      </p:sp>
+      <p:sp>
+        <p:nvSpPr>
+          <p:cNvPr id="3" name="Notes Placeholder 2"/>
+          <p:cNvSpPr>
+            <a:spLocks noGrp="1"/>
+          </p:cNvSpPr>
+          <p:nvPr>
+            <p:ph type="body" idx="1"/>
+          </p:nvPr>
+        </p:nvSpPr>
+        <p:spPr/>
+        <p:txBody>
+          <a:bodyPr/>
+          <a:lstStyle/>
+          <a:p>
+            <a:endParaRPr lang="en-US" dirty="0"/>
+          </a:p>
+        </p:txBody>
+      </p:sp>
+      <p:sp>
+        <p:nvSpPr>
+          <p:cNvPr id="4" name="Slide Number Placeholder 3"/>
+          <p:cNvSpPr>
+            <a:spLocks noGrp="1"/>
+          </p:cNvSpPr>
+          <p:nvPr>
+            <p:ph type="sldNum" sz="quarter" idx="5"/>
+          </p:nvPr>
+        </p:nvSpPr>
+        <p:spPr/>
+        <p:txBody>
+          <a:bodyPr/>
+          <a:lstStyle/>
+          <a:p>
+            <a:fld id="{CDB9F987-BC23-B549-9DCC-292DC84ED715}" type="slidenum">
+              <a:rPr lang="en-US" smtClean="0"/>
+              <a:t>6</a:t>
+            </a:fld>
+            <a:endParaRPr lang="en-US"/>
+          </a:p>
+        </p:txBody>
+      </p:sp>
+    </p:spTree>
+    <p:extLst>
+      <p:ext uri="{BB962C8B-B14F-4D97-AF65-F5344CB8AC3E}">
+        <p14:creationId xmlns:p14="http://schemas.microsoft.com/office/powerpoint/2010/main" val="895836380"/>
+      </p:ext>
+    </p:extLst>
+  </p:cSld>
+  <p:clrMapOvr>
+    <a:masterClrMapping/>
+  </p:clrMapOvr>
+</p:notes>
+</file>
+
+<file path=ppt/notesSlides/notesSlide6.xml><?xml version="1.0" encoding="utf-8"?>
+<p:notes xmlns:a="http://schemas.openxmlformats.org/drawingml/2006/main" xmlns:r="http://schemas.openxmlformats.org/officeDocument/2006/relationships" xmlns:p="http://schemas.openxmlformats.org/presentationml/2006/main">
+  <p:cSld>
+    <p:spTree>
+      <p:nvGrpSpPr>
+        <p:cNvPr id="1" name=""/>
+        <p:cNvGrpSpPr/>
+        <p:nvPr/>
+      </p:nvGrpSpPr>
+      <p:grpSpPr>
+        <a:xfrm>
+          <a:off x="0" y="0"/>
+          <a:ext cx="0" cy="0"/>
+          <a:chOff x="0" y="0"/>
+          <a:chExt cx="0" cy="0"/>
+        </a:xfrm>
+      </p:grpSpPr>
+      <p:sp>
+        <p:nvSpPr>
+          <p:cNvPr id="2" name="Slide Image Placeholder 1"/>
+          <p:cNvSpPr>
+            <a:spLocks noGrp="1" noRot="1" noChangeAspect="1"/>
+          </p:cNvSpPr>
+          <p:nvPr>
+            <p:ph type="sldImg"/>
+          </p:nvPr>
+        </p:nvSpPr>
+        <p:spPr/>
+      </p:sp>
+      <p:sp>
+        <p:nvSpPr>
+          <p:cNvPr id="3" name="Notes Placeholder 2"/>
+          <p:cNvSpPr>
+            <a:spLocks noGrp="1"/>
+          </p:cNvSpPr>
+          <p:nvPr>
+            <p:ph type="body" idx="1"/>
+          </p:nvPr>
+        </p:nvSpPr>
+        <p:spPr/>
+        <p:txBody>
+          <a:bodyPr/>
+          <a:lstStyle/>
+          <a:p>
+            <a:r>
+              <a:rPr lang="en-US" dirty="0"/>
+              <a:t>Example of </a:t>
+            </a:r>
+            <a:r>
+              <a:rPr lang="en-US" dirty="0" err="1"/>
+              <a:t>scp</a:t>
+            </a:r>
+            <a:r>
+              <a:rPr lang="en-US" dirty="0"/>
+              <a:t>: </a:t>
+            </a:r>
+          </a:p>
+          <a:p>
+            <a:endParaRPr lang="en-US" dirty="0"/>
+          </a:p>
+          <a:p>
+            <a:pPr marL="0" marR="0" lvl="0" indent="0" algn="l" defTabSz="914400" rtl="0" eaLnBrk="1" fontAlgn="auto" latinLnBrk="0" hangingPunct="1">
+              <a:lnSpc>
+                <a:spcPct val="100000"/>
+              </a:lnSpc>
+              <a:spcBef>
+                <a:spcPts val="0"/>
+              </a:spcBef>
+              <a:spcAft>
+                <a:spcPts val="0"/>
+              </a:spcAft>
+              <a:buClrTx/>
+              <a:buSzTx/>
+              <a:buFontTx/>
+              <a:buNone/>
+              <a:tabLst/>
+              <a:defRPr/>
+            </a:pPr>
+            <a:r>
+              <a:rPr lang="en-US" dirty="0" err="1"/>
+              <a:t>scp</a:t>
+            </a:r>
+            <a:r>
+              <a:rPr lang="en-US" dirty="0"/>
+              <a:t> </a:t>
+            </a:r>
+            <a:r>
+              <a:rPr lang="en-US" dirty="0" err="1"/>
+              <a:t>hello.cpp</a:t>
+            </a:r>
+            <a:r>
+              <a:rPr lang="en-US" dirty="0"/>
+              <a:t> jennifer@cs31.seas.ucla.edu:~/CS31</a:t>
+            </a:r>
+          </a:p>
+          <a:p>
+            <a:pPr marL="0" marR="0" lvl="0" indent="0" algn="l" defTabSz="914400" rtl="0" eaLnBrk="1" fontAlgn="auto" latinLnBrk="0" hangingPunct="1">
+              <a:lnSpc>
+                <a:spcPct val="100000"/>
+              </a:lnSpc>
+              <a:spcBef>
+                <a:spcPts val="0"/>
+              </a:spcBef>
+              <a:spcAft>
+                <a:spcPts val="0"/>
+              </a:spcAft>
+              <a:buClrTx/>
+              <a:buSzTx/>
+              <a:buFontTx/>
+              <a:buNone/>
+              <a:tabLst/>
+              <a:defRPr/>
+            </a:pPr>
+            <a:endParaRPr lang="en-US" dirty="0"/>
+          </a:p>
+          <a:p>
+            <a:pPr marL="0" marR="0" lvl="0" indent="0" algn="l" defTabSz="914400" rtl="0" eaLnBrk="1" fontAlgn="auto" latinLnBrk="0" hangingPunct="1">
+              <a:lnSpc>
+                <a:spcPct val="100000"/>
+              </a:lnSpc>
+              <a:spcBef>
+                <a:spcPts val="0"/>
+              </a:spcBef>
+              <a:spcAft>
+                <a:spcPts val="0"/>
+              </a:spcAft>
+              <a:buClrTx/>
+              <a:buSzTx/>
+              <a:buFontTx/>
+              <a:buNone/>
+              <a:tabLst/>
+              <a:defRPr/>
+            </a:pPr>
+            <a:endParaRPr lang="en-US" dirty="0"/>
           </a:p>
         </p:txBody>
       </p:sp>
@@ -1042,7 +1072,362 @@
     </p:spTree>
     <p:extLst>
       <p:ext uri="{BB962C8B-B14F-4D97-AF65-F5344CB8AC3E}">
-        <p14:creationId xmlns:p14="http://schemas.microsoft.com/office/powerpoint/2010/main" val="2594323258"/>
+        <p14:creationId xmlns:p14="http://schemas.microsoft.com/office/powerpoint/2010/main" val="1460448085"/>
+      </p:ext>
+    </p:extLst>
+  </p:cSld>
+  <p:clrMapOvr>
+    <a:masterClrMapping/>
+  </p:clrMapOvr>
+</p:notes>
+</file>
+
+<file path=ppt/notesSlides/notesSlide7.xml><?xml version="1.0" encoding="utf-8"?>
+<p:notes xmlns:a="http://schemas.openxmlformats.org/drawingml/2006/main" xmlns:r="http://schemas.openxmlformats.org/officeDocument/2006/relationships" xmlns:p="http://schemas.openxmlformats.org/presentationml/2006/main">
+  <p:cSld>
+    <p:spTree>
+      <p:nvGrpSpPr>
+        <p:cNvPr id="1" name=""/>
+        <p:cNvGrpSpPr/>
+        <p:nvPr/>
+      </p:nvGrpSpPr>
+      <p:grpSpPr>
+        <a:xfrm>
+          <a:off x="0" y="0"/>
+          <a:ext cx="0" cy="0"/>
+          <a:chOff x="0" y="0"/>
+          <a:chExt cx="0" cy="0"/>
+        </a:xfrm>
+      </p:grpSpPr>
+      <p:sp>
+        <p:nvSpPr>
+          <p:cNvPr id="2" name="Slide Image Placeholder 1"/>
+          <p:cNvSpPr>
+            <a:spLocks noGrp="1" noRot="1" noChangeAspect="1"/>
+          </p:cNvSpPr>
+          <p:nvPr>
+            <p:ph type="sldImg"/>
+          </p:nvPr>
+        </p:nvSpPr>
+        <p:spPr/>
+      </p:sp>
+      <p:sp>
+        <p:nvSpPr>
+          <p:cNvPr id="3" name="Notes Placeholder 2"/>
+          <p:cNvSpPr>
+            <a:spLocks noGrp="1"/>
+          </p:cNvSpPr>
+          <p:nvPr>
+            <p:ph type="body" idx="1"/>
+          </p:nvPr>
+        </p:nvSpPr>
+        <p:spPr/>
+        <p:txBody>
+          <a:bodyPr/>
+          <a:lstStyle/>
+          <a:p>
+            <a:endParaRPr lang="en-US" dirty="0"/>
+          </a:p>
+          <a:p>
+            <a:r>
+              <a:rPr lang="en-US" dirty="0"/>
+              <a:t>If there is an error when doing “ls ~/Desktop”, go to Seas help desk to fix account</a:t>
+            </a:r>
+          </a:p>
+          <a:p>
+            <a:endParaRPr lang="en-US" dirty="0"/>
+          </a:p>
+          <a:p>
+            <a:r>
+              <a:rPr lang="en-US" dirty="0"/>
+              <a:t>If there is a weird DNS spoofing warning when using </a:t>
+            </a:r>
+            <a:r>
+              <a:rPr lang="en-US" dirty="0" err="1"/>
+              <a:t>scp</a:t>
+            </a:r>
+            <a:r>
+              <a:rPr lang="en-US" dirty="0"/>
+              <a:t> or </a:t>
+            </a:r>
+            <a:r>
+              <a:rPr lang="en-US" dirty="0" err="1"/>
+              <a:t>ssh</a:t>
+            </a:r>
+            <a:r>
+              <a:rPr lang="en-US" dirty="0"/>
+              <a:t>, try:</a:t>
+            </a:r>
+          </a:p>
+          <a:p>
+            <a:pPr marL="228600" indent="-228600">
+              <a:buAutoNum type="arabicParenR"/>
+            </a:pPr>
+            <a:r>
+              <a:rPr lang="en-US" sz="1200" b="0" i="0" kern="1200" dirty="0">
+                <a:solidFill>
+                  <a:schemeClr val="tx1"/>
+                </a:solidFill>
+                <a:effectLst/>
+                <a:latin typeface="+mn-lt"/>
+                <a:ea typeface="+mn-ea"/>
+                <a:cs typeface="+mn-cs"/>
+              </a:rPr>
+              <a:t> </a:t>
+            </a:r>
+            <a:r>
+              <a:rPr lang="en-US" dirty="0" err="1"/>
+              <a:t>ssh</a:t>
+            </a:r>
+            <a:r>
+              <a:rPr lang="en-US" dirty="0"/>
+              <a:t> </a:t>
+            </a:r>
+            <a:r>
+              <a:rPr lang="en-US" i="1" dirty="0"/>
+              <a:t>yourSEASaccount</a:t>
+            </a:r>
+            <a:r>
+              <a:rPr lang="en-US" dirty="0"/>
+              <a:t>@cs31.seas.ucla.edu date ; </a:t>
+            </a:r>
+            <a:r>
+              <a:rPr lang="en-US" sz="1200" b="0" i="0" kern="1200" dirty="0">
+                <a:solidFill>
+                  <a:schemeClr val="tx1"/>
+                </a:solidFill>
+                <a:effectLst/>
+                <a:latin typeface="+mn-lt"/>
+                <a:ea typeface="+mn-ea"/>
+                <a:cs typeface="+mn-cs"/>
+              </a:rPr>
+              <a:t> </a:t>
+            </a:r>
+            <a:r>
+              <a:rPr lang="en-US" dirty="0" err="1"/>
+              <a:t>ssh</a:t>
+            </a:r>
+            <a:r>
+              <a:rPr lang="en-US" dirty="0"/>
+              <a:t> </a:t>
+            </a:r>
+            <a:r>
+              <a:rPr lang="en-US" i="1" dirty="0"/>
+              <a:t>yourSEASaccount</a:t>
+            </a:r>
+            <a:r>
+              <a:rPr lang="en-US" dirty="0"/>
+              <a:t>@cs31.seas.ucla.edu </a:t>
+            </a:r>
+          </a:p>
+          <a:p>
+            <a:pPr marL="228600" marR="0" lvl="0" indent="-228600" algn="l" defTabSz="914400" rtl="0" eaLnBrk="1" fontAlgn="auto" latinLnBrk="0" hangingPunct="1">
+              <a:lnSpc>
+                <a:spcPct val="100000"/>
+              </a:lnSpc>
+              <a:spcBef>
+                <a:spcPts val="0"/>
+              </a:spcBef>
+              <a:spcAft>
+                <a:spcPts val="0"/>
+              </a:spcAft>
+              <a:buClrTx/>
+              <a:buSzTx/>
+              <a:buFontTx/>
+              <a:buAutoNum type="arabicParenR"/>
+              <a:tabLst/>
+              <a:defRPr/>
+            </a:pPr>
+            <a:r>
+              <a:rPr lang="en-US" dirty="0"/>
+              <a:t>Remove cs31 line from ~/</a:t>
+            </a:r>
+            <a:r>
+              <a:rPr lang="en-US" sz="1200" kern="1200" dirty="0">
+                <a:solidFill>
+                  <a:schemeClr val="tx1"/>
+                </a:solidFill>
+                <a:effectLst/>
+                <a:latin typeface="+mn-lt"/>
+                <a:ea typeface="+mn-ea"/>
+                <a:cs typeface="+mn-cs"/>
+              </a:rPr>
+              <a:t>.</a:t>
+            </a:r>
+            <a:r>
+              <a:rPr lang="en-US" sz="1200" kern="1200" dirty="0" err="1">
+                <a:solidFill>
+                  <a:schemeClr val="tx1"/>
+                </a:solidFill>
+                <a:effectLst/>
+                <a:latin typeface="+mn-lt"/>
+                <a:ea typeface="+mn-ea"/>
+                <a:cs typeface="+mn-cs"/>
+              </a:rPr>
+              <a:t>ssh</a:t>
+            </a:r>
+            <a:r>
+              <a:rPr lang="en-US" sz="1200" kern="1200" dirty="0">
+                <a:solidFill>
+                  <a:schemeClr val="tx1"/>
+                </a:solidFill>
+                <a:effectLst/>
+                <a:latin typeface="+mn-lt"/>
+                <a:ea typeface="+mn-ea"/>
+                <a:cs typeface="+mn-cs"/>
+              </a:rPr>
+              <a:t>/</a:t>
+            </a:r>
+            <a:r>
+              <a:rPr lang="en-US" sz="1200" kern="1200" dirty="0" err="1">
+                <a:solidFill>
+                  <a:schemeClr val="tx1"/>
+                </a:solidFill>
+                <a:effectLst/>
+                <a:latin typeface="+mn-lt"/>
+                <a:ea typeface="+mn-ea"/>
+                <a:cs typeface="+mn-cs"/>
+              </a:rPr>
+              <a:t>known_hosts</a:t>
+            </a:r>
+            <a:r>
+              <a:rPr lang="en-US" sz="1200" kern="1200" dirty="0">
+                <a:solidFill>
+                  <a:schemeClr val="tx1"/>
+                </a:solidFill>
+                <a:effectLst/>
+                <a:latin typeface="+mn-lt"/>
+                <a:ea typeface="+mn-ea"/>
+                <a:cs typeface="+mn-cs"/>
+              </a:rPr>
+              <a:t> </a:t>
+            </a:r>
+          </a:p>
+          <a:p>
+            <a:pPr marL="228600" indent="-228600">
+              <a:buAutoNum type="arabicParenR"/>
+            </a:pPr>
+            <a:endParaRPr lang="en-US" dirty="0"/>
+          </a:p>
+          <a:p>
+            <a:pPr marL="228600" indent="-228600">
+              <a:buAutoNum type="arabicParenR"/>
+            </a:pPr>
+            <a:endParaRPr lang="en-US" dirty="0"/>
+          </a:p>
+        </p:txBody>
+      </p:sp>
+      <p:sp>
+        <p:nvSpPr>
+          <p:cNvPr id="4" name="Slide Number Placeholder 3"/>
+          <p:cNvSpPr>
+            <a:spLocks noGrp="1"/>
+          </p:cNvSpPr>
+          <p:nvPr>
+            <p:ph type="sldNum" sz="quarter" idx="5"/>
+          </p:nvPr>
+        </p:nvSpPr>
+        <p:spPr/>
+        <p:txBody>
+          <a:bodyPr/>
+          <a:lstStyle/>
+          <a:p>
+            <a:fld id="{CDB9F987-BC23-B549-9DCC-292DC84ED715}" type="slidenum">
+              <a:rPr lang="en-US" smtClean="0"/>
+              <a:t>8</a:t>
+            </a:fld>
+            <a:endParaRPr lang="en-US"/>
+          </a:p>
+        </p:txBody>
+      </p:sp>
+    </p:spTree>
+    <p:extLst>
+      <p:ext uri="{BB962C8B-B14F-4D97-AF65-F5344CB8AC3E}">
+        <p14:creationId xmlns:p14="http://schemas.microsoft.com/office/powerpoint/2010/main" val="4151812427"/>
+      </p:ext>
+    </p:extLst>
+  </p:cSld>
+  <p:clrMapOvr>
+    <a:masterClrMapping/>
+  </p:clrMapOvr>
+</p:notes>
+</file>
+
+<file path=ppt/notesSlides/notesSlide8.xml><?xml version="1.0" encoding="utf-8"?>
+<p:notes xmlns:a="http://schemas.openxmlformats.org/drawingml/2006/main" xmlns:r="http://schemas.openxmlformats.org/officeDocument/2006/relationships" xmlns:p="http://schemas.openxmlformats.org/presentationml/2006/main">
+  <p:cSld>
+    <p:spTree>
+      <p:nvGrpSpPr>
+        <p:cNvPr id="1" name=""/>
+        <p:cNvGrpSpPr/>
+        <p:nvPr/>
+      </p:nvGrpSpPr>
+      <p:grpSpPr>
+        <a:xfrm>
+          <a:off x="0" y="0"/>
+          <a:ext cx="0" cy="0"/>
+          <a:chOff x="0" y="0"/>
+          <a:chExt cx="0" cy="0"/>
+        </a:xfrm>
+      </p:grpSpPr>
+      <p:sp>
+        <p:nvSpPr>
+          <p:cNvPr id="2" name="Slide Image Placeholder 1"/>
+          <p:cNvSpPr>
+            <a:spLocks noGrp="1" noRot="1" noChangeAspect="1"/>
+          </p:cNvSpPr>
+          <p:nvPr>
+            <p:ph type="sldImg"/>
+          </p:nvPr>
+        </p:nvSpPr>
+        <p:spPr/>
+      </p:sp>
+      <p:sp>
+        <p:nvSpPr>
+          <p:cNvPr id="3" name="Notes Placeholder 2"/>
+          <p:cNvSpPr>
+            <a:spLocks noGrp="1"/>
+          </p:cNvSpPr>
+          <p:nvPr>
+            <p:ph type="body" idx="1"/>
+          </p:nvPr>
+        </p:nvSpPr>
+        <p:spPr/>
+        <p:txBody>
+          <a:bodyPr/>
+          <a:lstStyle/>
+          <a:p>
+            <a:endParaRPr lang="en-US" dirty="0"/>
+          </a:p>
+        </p:txBody>
+      </p:sp>
+      <p:sp>
+        <p:nvSpPr>
+          <p:cNvPr id="4" name="Slide Number Placeholder 3"/>
+          <p:cNvSpPr>
+            <a:spLocks noGrp="1"/>
+          </p:cNvSpPr>
+          <p:nvPr>
+            <p:ph type="sldNum" sz="quarter" idx="5"/>
+          </p:nvPr>
+        </p:nvSpPr>
+        <p:spPr/>
+        <p:txBody>
+          <a:bodyPr/>
+          <a:lstStyle/>
+          <a:p>
+            <a:fld id="{CDB9F987-BC23-B549-9DCC-292DC84ED715}" type="slidenum">
+              <a:rPr lang="en-US" smtClean="0"/>
+              <a:t>9</a:t>
+            </a:fld>
+            <a:endParaRPr lang="en-US"/>
+          </a:p>
+        </p:txBody>
+      </p:sp>
+    </p:spTree>
+    <p:extLst>
+      <p:ext uri="{BB962C8B-B14F-4D97-AF65-F5344CB8AC3E}">
+        <p14:creationId xmlns:p14="http://schemas.microsoft.com/office/powerpoint/2010/main" val="2316872187"/>
       </p:ext>
     </p:extLst>
   </p:cSld>
@@ -1199,7 +1584,7 @@
           <a:p>
             <a:fld id="{3FCDF464-0580-D94C-AEA1-91B4B1F2D6F0}" type="datetimeFigureOut">
               <a:rPr lang="en-US" smtClean="0"/>
-              <a:t>10/4/18</a:t>
+              <a:t>10/5/18</a:t>
             </a:fld>
             <a:endParaRPr lang="en-US"/>
           </a:p>
@@ -1397,7 +1782,7 @@
           <a:p>
             <a:fld id="{3FCDF464-0580-D94C-AEA1-91B4B1F2D6F0}" type="datetimeFigureOut">
               <a:rPr lang="en-US" smtClean="0"/>
-              <a:t>10/4/18</a:t>
+              <a:t>10/5/18</a:t>
             </a:fld>
             <a:endParaRPr lang="en-US"/>
           </a:p>
@@ -1605,7 +1990,7 @@
           <a:p>
             <a:fld id="{3FCDF464-0580-D94C-AEA1-91B4B1F2D6F0}" type="datetimeFigureOut">
               <a:rPr lang="en-US" smtClean="0"/>
-              <a:t>10/4/18</a:t>
+              <a:t>10/5/18</a:t>
             </a:fld>
             <a:endParaRPr lang="en-US"/>
           </a:p>
@@ -1803,7 +2188,7 @@
           <a:p>
             <a:fld id="{3FCDF464-0580-D94C-AEA1-91B4B1F2D6F0}" type="datetimeFigureOut">
               <a:rPr lang="en-US" smtClean="0"/>
-              <a:t>10/4/18</a:t>
+              <a:t>10/5/18</a:t>
             </a:fld>
             <a:endParaRPr lang="en-US"/>
           </a:p>
@@ -2078,7 +2463,7 @@
           <a:p>
             <a:fld id="{3FCDF464-0580-D94C-AEA1-91B4B1F2D6F0}" type="datetimeFigureOut">
               <a:rPr lang="en-US" smtClean="0"/>
-              <a:t>10/4/18</a:t>
+              <a:t>10/5/18</a:t>
             </a:fld>
             <a:endParaRPr lang="en-US"/>
           </a:p>
@@ -2343,7 +2728,7 @@
           <a:p>
             <a:fld id="{3FCDF464-0580-D94C-AEA1-91B4B1F2D6F0}" type="datetimeFigureOut">
               <a:rPr lang="en-US" smtClean="0"/>
-              <a:t>10/4/18</a:t>
+              <a:t>10/5/18</a:t>
             </a:fld>
             <a:endParaRPr lang="en-US"/>
           </a:p>
@@ -2755,7 +3140,7 @@
           <a:p>
             <a:fld id="{3FCDF464-0580-D94C-AEA1-91B4B1F2D6F0}" type="datetimeFigureOut">
               <a:rPr lang="en-US" smtClean="0"/>
-              <a:t>10/4/18</a:t>
+              <a:t>10/5/18</a:t>
             </a:fld>
             <a:endParaRPr lang="en-US"/>
           </a:p>
@@ -2896,7 +3281,7 @@
           <a:p>
             <a:fld id="{3FCDF464-0580-D94C-AEA1-91B4B1F2D6F0}" type="datetimeFigureOut">
               <a:rPr lang="en-US" smtClean="0"/>
-              <a:t>10/4/18</a:t>
+              <a:t>10/5/18</a:t>
             </a:fld>
             <a:endParaRPr lang="en-US"/>
           </a:p>
@@ -3009,7 +3394,7 @@
           <a:p>
             <a:fld id="{3FCDF464-0580-D94C-AEA1-91B4B1F2D6F0}" type="datetimeFigureOut">
               <a:rPr lang="en-US" smtClean="0"/>
-              <a:t>10/4/18</a:t>
+              <a:t>10/5/18</a:t>
             </a:fld>
             <a:endParaRPr lang="en-US"/>
           </a:p>
@@ -3320,7 +3705,7 @@
           <a:p>
             <a:fld id="{3FCDF464-0580-D94C-AEA1-91B4B1F2D6F0}" type="datetimeFigureOut">
               <a:rPr lang="en-US" smtClean="0"/>
-              <a:t>10/4/18</a:t>
+              <a:t>10/5/18</a:t>
             </a:fld>
             <a:endParaRPr lang="en-US"/>
           </a:p>
@@ -3608,7 +3993,7 @@
           <a:p>
             <a:fld id="{3FCDF464-0580-D94C-AEA1-91B4B1F2D6F0}" type="datetimeFigureOut">
               <a:rPr lang="en-US" smtClean="0"/>
-              <a:t>10/4/18</a:t>
+              <a:t>10/5/18</a:t>
             </a:fld>
             <a:endParaRPr lang="en-US"/>
           </a:p>
@@ -3849,7 +4234,7 @@
           <a:p>
             <a:fld id="{3FCDF464-0580-D94C-AEA1-91B4B1F2D6F0}" type="datetimeFigureOut">
               <a:rPr lang="en-US" smtClean="0"/>
-              <a:t>10/4/18</a:t>
+              <a:t>10/5/18</a:t>
             </a:fld>
             <a:endParaRPr lang="en-US"/>
           </a:p>
@@ -4376,7 +4761,7 @@
           <p:cNvPr id="2" name="Title 1">
             <a:extLst>
               <a:ext uri="{FF2B5EF4-FFF2-40B4-BE49-F238E27FC236}">
-                <a16:creationId xmlns:a16="http://schemas.microsoft.com/office/drawing/2014/main" id="{118A29B1-C038-DF43-9334-3E4711C27D49}"/>
+                <a16:creationId xmlns:a16="http://schemas.microsoft.com/office/drawing/2014/main" id="{B87B10F3-9DF0-A247-866B-20D3F76EE63B}"/>
               </a:ext>
             </a:extLst>
           </p:cNvPr>
@@ -4394,7 +4779,7 @@
           <a:p>
             <a:r>
               <a:rPr lang="en-US" dirty="0"/>
-              <a:t>Practice Problems:</a:t>
+              <a:t>Tips</a:t>
             </a:r>
           </a:p>
         </p:txBody>
@@ -4404,7 +4789,7 @@
           <p:cNvPr id="3" name="Content Placeholder 2">
             <a:extLst>
               <a:ext uri="{FF2B5EF4-FFF2-40B4-BE49-F238E27FC236}">
-                <a16:creationId xmlns:a16="http://schemas.microsoft.com/office/drawing/2014/main" id="{8A2926D2-E092-C141-9CE7-C73CD2627F99}"/>
+                <a16:creationId xmlns:a16="http://schemas.microsoft.com/office/drawing/2014/main" id="{83FE603A-BAEC-834C-8B03-F5AA36139B46}"/>
               </a:ext>
             </a:extLst>
           </p:cNvPr>
@@ -4417,74 +4802,92 @@
         </p:nvSpPr>
         <p:spPr/>
         <p:txBody>
-          <a:bodyPr/>
-          <a:lstStyle/>
-          <a:p>
-            <a:pPr marL="514350" indent="-514350">
-              <a:buFont typeface="+mj-lt"/>
-              <a:buAutoNum type="arabicPeriod"/>
+          <a:bodyPr>
+            <a:normAutofit lnSpcReduction="10000"/>
+          </a:bodyPr>
+          <a:lstStyle/>
+          <a:p>
+            <a:r>
+              <a:rPr lang="en-US" dirty="0"/>
+              <a:t>Bash alias for </a:t>
+            </a:r>
+            <a:r>
+              <a:rPr lang="en-US" dirty="0" err="1"/>
+              <a:t>ssh</a:t>
+            </a:r>
+            <a:r>
+              <a:rPr lang="en-US" dirty="0"/>
+              <a:t> to seas. Add the following line to ~/.</a:t>
+            </a:r>
+            <a:r>
+              <a:rPr lang="en-US" dirty="0" err="1"/>
+              <a:t>bashrc</a:t>
+            </a:r>
+            <a:endParaRPr lang="en-US" dirty="0"/>
+          </a:p>
+          <a:p>
+            <a:pPr marL="457200" lvl="1" indent="0">
+              <a:buNone/>
             </a:pPr>
             <a:r>
               <a:rPr lang="en-US" dirty="0"/>
-              <a:t>Identify whether the following variable names are valid in C++: _</a:t>
+              <a:t>alias cs31="</a:t>
             </a:r>
             <a:r>
               <a:rPr lang="en-US" dirty="0" err="1"/>
-              <a:t>myVariable</a:t>
-            </a:r>
-            <a:r>
-              <a:rPr lang="en-US" dirty="0"/>
-              <a:t>, 2candidates, </a:t>
+              <a:t>ssh</a:t>
+            </a:r>
+            <a:r>
+              <a:rPr lang="en-US" dirty="0"/>
+              <a:t> &lt;username&gt;@cs31.seas.ucla.edu”</a:t>
+            </a:r>
+          </a:p>
+          <a:p>
+            <a:pPr marL="457200" lvl="1" indent="0">
+              <a:buNone/>
+            </a:pPr>
+            <a:endParaRPr lang="en-US" dirty="0"/>
+          </a:p>
+          <a:p>
+            <a:r>
+              <a:rPr lang="en-US" dirty="0"/>
+              <a:t>If you have multiple errors, correct errors sequentially and re-compile after each one.</a:t>
+            </a:r>
+          </a:p>
+          <a:p>
+            <a:endParaRPr lang="en-US" dirty="0"/>
+          </a:p>
+          <a:p>
+            <a:r>
+              <a:rPr lang="en-US" dirty="0"/>
+              <a:t>Develop incrementally</a:t>
+            </a:r>
+          </a:p>
+          <a:p>
+            <a:pPr marL="0" indent="0">
+              <a:buNone/>
+            </a:pPr>
+            <a:endParaRPr lang="en-US" dirty="0"/>
+          </a:p>
+          <a:p>
+            <a:r>
+              <a:rPr lang="en-US" dirty="0"/>
+              <a:t>Can use script to check filenames and compile before submission (</a:t>
             </a:r>
             <a:r>
               <a:rPr lang="en-US" dirty="0" err="1"/>
-              <a:t>MyCat</a:t>
-            </a:r>
-            <a:r>
-              <a:rPr lang="en-US" dirty="0"/>
-              <a:t>, </a:t>
-            </a:r>
-            <a:r>
-              <a:rPr lang="en-US" dirty="0" err="1"/>
-              <a:t>cat.name</a:t>
-            </a:r>
-            <a:r>
-              <a:rPr lang="en-US" dirty="0"/>
-              <a:t>, </a:t>
-            </a:r>
-            <a:r>
-              <a:rPr lang="en-US" dirty="0" err="1"/>
-              <a:t>cat_color</a:t>
-            </a:r>
+              <a:t>compileAll.sh</a:t>
+            </a:r>
+            <a:r>
+              <a:rPr lang="en-US" dirty="0"/>
+              <a:t>)</a:t>
+            </a:r>
+          </a:p>
+          <a:p>
+            <a:pPr marL="457200" lvl="1" indent="0">
+              <a:buNone/>
+            </a:pPr>
             <a:endParaRPr lang="en-US" dirty="0"/>
-          </a:p>
-          <a:p>
-            <a:pPr marL="514350" indent="-514350">
-              <a:buFont typeface="+mj-lt"/>
-              <a:buAutoNum type="arabicPeriod"/>
-            </a:pPr>
-            <a:r>
-              <a:rPr lang="en-US" dirty="0"/>
-              <a:t>Write a program that contains statements that output the values of five or six variables that have been defined, but not initialized.  Compile and run the program.  What is the output?  Explain.</a:t>
-            </a:r>
-          </a:p>
-          <a:p>
-            <a:pPr marL="514350" indent="-514350">
-              <a:buFont typeface="+mj-lt"/>
-              <a:buAutoNum type="arabicPeriod"/>
-            </a:pPr>
-            <a:r>
-              <a:rPr lang="en-US" dirty="0"/>
-              <a:t>Write a program (</a:t>
-            </a:r>
-            <a:r>
-              <a:rPr lang="en-US" dirty="0" err="1"/>
-              <a:t>box.cpp</a:t>
-            </a:r>
-            <a:r>
-              <a:rPr lang="en-US" dirty="0"/>
-              <a:t>) that takes as input the width, length, and height of a rectangular box and outputs its volume and surface area.</a:t>
-            </a:r>
           </a:p>
           <a:p>
             <a:pPr marL="0" indent="0">
@@ -4497,7 +4900,7 @@
     </p:spTree>
     <p:extLst>
       <p:ext uri="{BB962C8B-B14F-4D97-AF65-F5344CB8AC3E}">
-        <p14:creationId xmlns:p14="http://schemas.microsoft.com/office/powerpoint/2010/main" val="3729281915"/>
+        <p14:creationId xmlns:p14="http://schemas.microsoft.com/office/powerpoint/2010/main" val="3915033385"/>
       </p:ext>
     </p:extLst>
   </p:cSld>
@@ -4529,7 +4932,7 @@
           <p:cNvPr id="2" name="Title 1">
             <a:extLst>
               <a:ext uri="{FF2B5EF4-FFF2-40B4-BE49-F238E27FC236}">
-                <a16:creationId xmlns:a16="http://schemas.microsoft.com/office/drawing/2014/main" id="{B3BAE835-9536-184B-994F-EA81FB3130FB}"/>
+                <a16:creationId xmlns:a16="http://schemas.microsoft.com/office/drawing/2014/main" id="{118A29B1-C038-DF43-9334-3E4711C27D49}"/>
               </a:ext>
             </a:extLst>
           </p:cNvPr>
@@ -4540,39 +4943,117 @@
             <p:ph type="title"/>
           </p:nvPr>
         </p:nvSpPr>
-        <p:spPr>
-          <a:xfrm>
-            <a:off x="838200" y="365125"/>
-            <a:ext cx="10515600" cy="6110626"/>
-          </a:xfrm>
-        </p:spPr>
-        <p:txBody>
-          <a:bodyPr>
-            <a:normAutofit/>
-          </a:bodyPr>
-          <a:lstStyle/>
-          <a:p>
-            <a:r>
-              <a:rPr lang="en-US" dirty="0"/>
-              <a:t>Thanks for your attention.</a:t>
-            </a:r>
-            <a:br>
-              <a:rPr lang="en-US" dirty="0"/>
-            </a:br>
-            <a:br>
-              <a:rPr lang="en-US" dirty="0"/>
-            </a:br>
-            <a:r>
-              <a:rPr lang="en-US" dirty="0"/>
-              <a:t>Questions?</a:t>
-            </a:r>
+        <p:spPr/>
+        <p:txBody>
+          <a:bodyPr/>
+          <a:lstStyle/>
+          <a:p>
+            <a:r>
+              <a:rPr lang="en-US" dirty="0"/>
+              <a:t>Practice Problems:</a:t>
+            </a:r>
+          </a:p>
+        </p:txBody>
+      </p:sp>
+      <p:sp>
+        <p:nvSpPr>
+          <p:cNvPr id="3" name="Content Placeholder 2">
+            <a:extLst>
+              <a:ext uri="{FF2B5EF4-FFF2-40B4-BE49-F238E27FC236}">
+                <a16:creationId xmlns:a16="http://schemas.microsoft.com/office/drawing/2014/main" id="{8A2926D2-E092-C141-9CE7-C73CD2627F99}"/>
+              </a:ext>
+            </a:extLst>
+          </p:cNvPr>
+          <p:cNvSpPr>
+            <a:spLocks noGrp="1"/>
+          </p:cNvSpPr>
+          <p:nvPr>
+            <p:ph idx="1"/>
+          </p:nvPr>
+        </p:nvSpPr>
+        <p:spPr/>
+        <p:txBody>
+          <a:bodyPr/>
+          <a:lstStyle/>
+          <a:p>
+            <a:pPr marL="514350" indent="-514350">
+              <a:buFont typeface="+mj-lt"/>
+              <a:buAutoNum type="arabicPeriod"/>
+            </a:pPr>
+            <a:r>
+              <a:rPr lang="en-US" dirty="0"/>
+              <a:t>Identify whether the following variable names are valid in C++: _</a:t>
+            </a:r>
+            <a:r>
+              <a:rPr lang="en-US" dirty="0" err="1"/>
+              <a:t>myVariable</a:t>
+            </a:r>
+            <a:r>
+              <a:rPr lang="en-US" dirty="0"/>
+              <a:t>, 2candidates, </a:t>
+            </a:r>
+            <a:r>
+              <a:rPr lang="en-US" dirty="0" err="1"/>
+              <a:t>MyCat</a:t>
+            </a:r>
+            <a:r>
+              <a:rPr lang="en-US" dirty="0"/>
+              <a:t>, </a:t>
+            </a:r>
+            <a:r>
+              <a:rPr lang="en-US" dirty="0" err="1"/>
+              <a:t>cat.name</a:t>
+            </a:r>
+            <a:r>
+              <a:rPr lang="en-US" dirty="0"/>
+              <a:t>, </a:t>
+            </a:r>
+            <a:r>
+              <a:rPr lang="en-US" dirty="0" err="1"/>
+              <a:t>cat_color</a:t>
+            </a:r>
+            <a:endParaRPr lang="en-US" dirty="0"/>
+          </a:p>
+          <a:p>
+            <a:pPr marL="514350" indent="-514350">
+              <a:buFont typeface="+mj-lt"/>
+              <a:buAutoNum type="arabicPeriod"/>
+            </a:pPr>
+            <a:r>
+              <a:rPr lang="en-US" dirty="0"/>
+              <a:t>Write a program that contains statements that output the values of five or six variables that have been defined, but not initialized.  Compile and run the program.  What is the output?  Explain.</a:t>
+            </a:r>
+          </a:p>
+          <a:p>
+            <a:pPr marL="514350" indent="-514350">
+              <a:buFont typeface="+mj-lt"/>
+              <a:buAutoNum type="arabicPeriod"/>
+            </a:pPr>
+            <a:r>
+              <a:rPr lang="en-US" dirty="0"/>
+              <a:t>Write a program (</a:t>
+            </a:r>
+            <a:r>
+              <a:rPr lang="en-US" dirty="0" err="1"/>
+              <a:t>box.cpp</a:t>
+            </a:r>
+            <a:r>
+              <a:rPr lang="en-US" dirty="0"/>
+              <a:t>) that takes as input the width, length, and height of a rectangular box and outputs its volume and surface area.</a:t>
+            </a:r>
+          </a:p>
+          <a:p>
+            <a:pPr marL="0" indent="0">
+              <a:buNone/>
+            </a:pPr>
+            <a:endParaRPr lang="en-US" dirty="0"/>
           </a:p>
         </p:txBody>
       </p:sp>
     </p:spTree>
     <p:extLst>
       <p:ext uri="{BB962C8B-B14F-4D97-AF65-F5344CB8AC3E}">
-        <p14:creationId xmlns:p14="http://schemas.microsoft.com/office/powerpoint/2010/main" val="1310247429"/>
+        <p14:creationId xmlns:p14="http://schemas.microsoft.com/office/powerpoint/2010/main" val="3729281915"/>
       </p:ext>
     </p:extLst>
   </p:cSld>
@@ -4897,7 +5378,7 @@
             </a:r>
             <a:r>
               <a:rPr lang="en-US" dirty="0" err="1"/>
-              <a:t>floats.cpp</a:t>
+              <a:t>doubles.cpp</a:t>
             </a:r>
             <a:r>
               <a:rPr lang="en-US" dirty="0"/>
@@ -5206,7 +5687,17 @@
               <a:rPr lang="en-US" dirty="0" err="1"/>
               <a:t>Xcode</a:t>
             </a:r>
-            <a:endParaRPr lang="en-US" dirty="0"/>
+            <a:r>
+              <a:rPr lang="en-US" dirty="0"/>
+              <a:t>  </a:t>
+            </a:r>
+          </a:p>
+          <a:p>
+            <a:pPr lvl="1"/>
+            <a:r>
+              <a:rPr lang="en-US" dirty="0"/>
+              <a:t>Your code must compile using one of these IDEs; you can choose</a:t>
+            </a:r>
           </a:p>
         </p:txBody>
       </p:sp>
@@ -5245,7 +5736,7 @@
           <p:cNvPr id="2" name="Title 1">
             <a:extLst>
               <a:ext uri="{FF2B5EF4-FFF2-40B4-BE49-F238E27FC236}">
-                <a16:creationId xmlns:a16="http://schemas.microsoft.com/office/drawing/2014/main" id="{1294B6AA-4398-184B-BCB8-A393AB4164DB}"/>
+                <a16:creationId xmlns:a16="http://schemas.microsoft.com/office/drawing/2014/main" id="{E69AE717-8A01-6F4E-B6C2-A2EC2F6AC992}"/>
               </a:ext>
             </a:extLst>
           </p:cNvPr>
@@ -5263,7 +5754,7 @@
           <a:p>
             <a:r>
               <a:rPr lang="en-US" dirty="0"/>
-              <a:t>Compiling projects/homework (Mac)</a:t>
+              <a:t>Transferring files from your local machine to a remote server</a:t>
             </a:r>
           </a:p>
         </p:txBody>
@@ -5273,7 +5764,7 @@
           <p:cNvPr id="3" name="Content Placeholder 2">
             <a:extLst>
               <a:ext uri="{FF2B5EF4-FFF2-40B4-BE49-F238E27FC236}">
-                <a16:creationId xmlns:a16="http://schemas.microsoft.com/office/drawing/2014/main" id="{D2220137-DE35-304B-8D77-0F2B1C94426C}"/>
+                <a16:creationId xmlns:a16="http://schemas.microsoft.com/office/drawing/2014/main" id="{00A4C489-CDBB-3144-93EE-C8533F07C514}"/>
               </a:ext>
             </a:extLst>
           </p:cNvPr>
@@ -5287,153 +5778,106 @@
         <p:spPr/>
         <p:txBody>
           <a:bodyPr>
-            <a:normAutofit fontScale="92500" lnSpcReduction="10000"/>
+            <a:normAutofit fontScale="92500"/>
           </a:bodyPr>
           <a:lstStyle/>
           <a:p>
             <a:r>
               <a:rPr lang="en-US" dirty="0"/>
-              <a:t>Your programs must run successfully using </a:t>
-            </a:r>
-          </a:p>
-          <a:p>
-            <a:pPr marL="914400" lvl="1" indent="-457200">
-              <a:buFont typeface="+mj-lt"/>
-              <a:buAutoNum type="arabicPeriod"/>
-            </a:pPr>
-            <a:r>
-              <a:rPr lang="en-US" dirty="0"/>
-              <a:t>Visual C++ or </a:t>
-            </a:r>
-            <a:r>
-              <a:rPr lang="en-US" dirty="0" err="1"/>
-              <a:t>Xcode</a:t>
-            </a:r>
+              <a:t>You need to transfer your code to cs31.seas.ucla.edu to use the g31 compiler. </a:t>
+            </a:r>
+          </a:p>
+          <a:p>
+            <a:r>
+              <a:rPr lang="en-US" dirty="0"/>
+              <a:t>Options</a:t>
+            </a:r>
+          </a:p>
+          <a:p>
+            <a:pPr lvl="1"/>
+            <a:r>
+              <a:rPr lang="en-US" dirty="0"/>
+              <a:t>Remote Desktop</a:t>
+            </a:r>
+          </a:p>
+          <a:p>
+            <a:pPr lvl="2"/>
+            <a:r>
+              <a:rPr lang="en-US" dirty="0"/>
+              <a:t>Note: Instructions on website may not be compatible with Windows 10</a:t>
+            </a:r>
+          </a:p>
+          <a:p>
+            <a:pPr lvl="2"/>
             <a:endParaRPr lang="en-US" dirty="0"/>
           </a:p>
           <a:p>
-            <a:pPr marL="914400" lvl="1" indent="-457200">
-              <a:buFont typeface="+mj-lt"/>
-              <a:buAutoNum type="arabicPeriod"/>
-            </a:pPr>
-            <a:r>
-              <a:rPr lang="en-US" dirty="0"/>
-              <a:t>g31</a:t>
-            </a:r>
-          </a:p>
-          <a:p>
-            <a:pPr marL="457200" lvl="1" indent="0">
-              <a:buNone/>
-            </a:pPr>
-            <a:endParaRPr lang="en-US" dirty="0"/>
-          </a:p>
-          <a:p>
-            <a:r>
-              <a:rPr lang="en-US" dirty="0"/>
-              <a:t>How do I check if my code can compile using g31?</a:t>
-            </a:r>
-          </a:p>
-          <a:p>
-            <a:pPr marL="457200" lvl="1" indent="0">
-              <a:buNone/>
-            </a:pPr>
+            <a:pPr lvl="1"/>
             <a:r>
               <a:rPr lang="en-US" dirty="0" err="1"/>
               <a:t>scp</a:t>
             </a:r>
             <a:r>
               <a:rPr lang="en-US" dirty="0"/>
-              <a:t> </a:t>
-            </a:r>
+              <a:t> (Only for Mac/Linux users, more info to follow)</a:t>
+            </a:r>
+          </a:p>
+          <a:p>
+            <a:pPr lvl="1"/>
+            <a:endParaRPr lang="en-US" dirty="0"/>
+          </a:p>
+          <a:p>
+            <a:pPr lvl="1"/>
             <a:r>
               <a:rPr lang="en-US" dirty="0" err="1"/>
-              <a:t>hello.cpp</a:t>
-            </a:r>
-            <a:r>
-              <a:rPr lang="en-US" dirty="0"/>
-              <a:t> jennifer@cs31.seas.ucla.edu:~/CS31</a:t>
-            </a:r>
-          </a:p>
-          <a:p>
-            <a:pPr marL="457200" lvl="1" indent="0">
-              <a:buNone/>
-            </a:pPr>
+              <a:t>pscp</a:t>
+            </a:r>
+            <a:r>
+              <a:rPr lang="en-US" dirty="0"/>
+              <a:t> (Version of </a:t>
+            </a:r>
             <a:r>
               <a:rPr lang="en-US" dirty="0" err="1"/>
-              <a:t>ssh</a:t>
-            </a:r>
-            <a:r>
-              <a:rPr lang="en-US" dirty="0"/>
-              <a:t> jennifer@cs31.seas.ucla.edu </a:t>
-            </a:r>
-          </a:p>
-          <a:p>
-            <a:pPr marL="457200" lvl="1" indent="0">
-              <a:buNone/>
-            </a:pPr>
-            <a:r>
-              <a:rPr lang="en-US" dirty="0"/>
-              <a:t>ls ~/Desktop</a:t>
-            </a:r>
-          </a:p>
-          <a:p>
-            <a:pPr marL="457200" lvl="1" indent="0">
-              <a:buNone/>
-            </a:pPr>
-            <a:r>
-              <a:rPr lang="en-US" dirty="0"/>
-              <a:t>curl -s -L http://</a:t>
+              <a:t>scp</a:t>
+            </a:r>
+            <a:r>
+              <a:rPr lang="en-US" dirty="0"/>
+              <a:t> for Windows.  May be difficult to set up on some machines)</a:t>
+            </a:r>
+          </a:p>
+          <a:p>
+            <a:pPr lvl="1"/>
+            <a:endParaRPr lang="en-US" dirty="0"/>
+          </a:p>
+          <a:p>
+            <a:pPr lvl="1"/>
+            <a:r>
+              <a:rPr lang="en-US" dirty="0"/>
+              <a:t>WinSCP (GUI that uses </a:t>
             </a:r>
             <a:r>
               <a:rPr lang="en-US" dirty="0" err="1"/>
-              <a:t>cs.ucla.edu</a:t>
-            </a:r>
-            <a:r>
-              <a:rPr lang="en-US" dirty="0"/>
-              <a:t>/classes/fall18/cs31/Utilities/setupg31 | bash</a:t>
-            </a:r>
-          </a:p>
-          <a:p>
-            <a:pPr marL="457200" lvl="1" indent="0">
-              <a:buNone/>
-            </a:pPr>
-            <a:r>
-              <a:rPr lang="en-US" dirty="0"/>
-              <a:t>cd CS31</a:t>
-            </a:r>
-          </a:p>
-          <a:p>
-            <a:pPr marL="457200" lvl="1" indent="0">
-              <a:buNone/>
-            </a:pPr>
-            <a:r>
-              <a:rPr lang="en-US" dirty="0"/>
-              <a:t>g31 </a:t>
-            </a:r>
-            <a:r>
-              <a:rPr lang="en-US" dirty="0" err="1"/>
-              <a:t>hello.cpp</a:t>
-            </a:r>
-            <a:r>
-              <a:rPr lang="en-US" dirty="0"/>
-              <a:t> –o hello</a:t>
-            </a:r>
-          </a:p>
-          <a:p>
-            <a:pPr marL="457200" lvl="1" indent="0">
-              <a:buNone/>
-            </a:pPr>
-            <a:r>
-              <a:rPr lang="en-US" dirty="0"/>
-              <a:t>./hello</a:t>
-            </a:r>
+              <a:t>pscp</a:t>
+            </a:r>
+            <a:r>
+              <a:rPr lang="en-US" dirty="0"/>
+              <a:t>.  My personal recommendation for Windows users)</a:t>
+            </a:r>
+          </a:p>
+          <a:p>
+            <a:pPr lvl="1"/>
+            <a:endParaRPr lang="en-US" dirty="0"/>
+          </a:p>
+          <a:p>
+            <a:pPr lvl="1"/>
+            <a:endParaRPr lang="en-US" dirty="0"/>
           </a:p>
         </p:txBody>
       </p:sp>
     </p:spTree>
     <p:extLst>
       <p:ext uri="{BB962C8B-B14F-4D97-AF65-F5344CB8AC3E}">
-        <p14:creationId xmlns:p14="http://schemas.microsoft.com/office/powerpoint/2010/main" val="3740135673"/>
+        <p14:creationId xmlns:p14="http://schemas.microsoft.com/office/powerpoint/2010/main" val="2099817712"/>
       </p:ext>
     </p:extLst>
   </p:cSld>
@@ -5465,7 +5909,7 @@
           <p:cNvPr id="2" name="Title 1">
             <a:extLst>
               <a:ext uri="{FF2B5EF4-FFF2-40B4-BE49-F238E27FC236}">
-                <a16:creationId xmlns:a16="http://schemas.microsoft.com/office/drawing/2014/main" id="{1294B6AA-4398-184B-BCB8-A393AB4164DB}"/>
+                <a16:creationId xmlns:a16="http://schemas.microsoft.com/office/drawing/2014/main" id="{DC9E4C4E-4350-494C-8010-0AA2202891EE}"/>
               </a:ext>
             </a:extLst>
           </p:cNvPr>
@@ -5483,7 +5927,7 @@
           <a:p>
             <a:r>
               <a:rPr lang="en-US" dirty="0"/>
-              <a:t>Compiling projects/homework (Windows)</a:t>
+              <a:t>Common bash commands (use on Mac or Linux terminals)</a:t>
             </a:r>
           </a:p>
         </p:txBody>
@@ -5493,7 +5937,7 @@
           <p:cNvPr id="3" name="Content Placeholder 2">
             <a:extLst>
               <a:ext uri="{FF2B5EF4-FFF2-40B4-BE49-F238E27FC236}">
-                <a16:creationId xmlns:a16="http://schemas.microsoft.com/office/drawing/2014/main" id="{D2220137-DE35-304B-8D77-0F2B1C94426C}"/>
+                <a16:creationId xmlns:a16="http://schemas.microsoft.com/office/drawing/2014/main" id="{73CC3875-F550-B04F-902C-1E8E0E824E11}"/>
               </a:ext>
             </a:extLst>
           </p:cNvPr>
@@ -5507,118 +5951,181 @@
         <p:spPr/>
         <p:txBody>
           <a:bodyPr>
-            <a:normAutofit/>
+            <a:normAutofit fontScale="77500" lnSpcReduction="20000"/>
           </a:bodyPr>
           <a:lstStyle/>
           <a:p>
             <a:r>
               <a:rPr lang="en-US" dirty="0"/>
-              <a:t>Copy file from local computer to </a:t>
+              <a:t>ls : show all files in directory</a:t>
+            </a:r>
+          </a:p>
+          <a:p>
+            <a:r>
+              <a:rPr lang="en-US" dirty="0"/>
+              <a:t>cd &lt;</a:t>
             </a:r>
             <a:r>
               <a:rPr lang="en-US" dirty="0" err="1"/>
-              <a:t>SEASnet</a:t>
-            </a:r>
-            <a:r>
-              <a:rPr lang="en-US" dirty="0"/>
-              <a:t> server using 1 or 2</a:t>
-            </a:r>
-          </a:p>
-          <a:p>
-            <a:pPr marL="971550" lvl="1" indent="-514350">
-              <a:buFont typeface="+mj-lt"/>
-              <a:buAutoNum type="arabicPeriod"/>
-            </a:pPr>
-            <a:r>
-              <a:rPr lang="en-US" dirty="0"/>
-              <a:t>Set up remote desktop and copy file to </a:t>
-            </a:r>
+              <a:t>new_dir</a:t>
+            </a:r>
+            <a:r>
+              <a:rPr lang="en-US" dirty="0"/>
+              <a:t>&gt; : change directory</a:t>
+            </a:r>
+          </a:p>
+          <a:p>
             <a:r>
               <a:rPr lang="en-US" dirty="0" err="1"/>
-              <a:t>SEASnet</a:t>
-            </a:r>
-            <a:r>
-              <a:rPr lang="en-US" dirty="0"/>
-              <a:t> machine using remote desktop </a:t>
-            </a:r>
-            <a:r>
-              <a:rPr lang="en-US" dirty="0">
-                <a:hlinkClick r:id="rId3"/>
-              </a:rPr>
-              <a:t>https://www.seasnet.ucla.edu/setting-up-remoteapps-and-remote-desktop/</a:t>
-            </a:r>
-            <a:endParaRPr lang="en-US" dirty="0"/>
-          </a:p>
-          <a:p>
-            <a:pPr marL="971550" lvl="1" indent="-514350">
-              <a:buFont typeface="+mj-lt"/>
-              <a:buAutoNum type="arabicPeriod"/>
-            </a:pPr>
-            <a:endParaRPr lang="en-US" dirty="0"/>
-          </a:p>
-          <a:p>
-            <a:pPr marL="971550" lvl="1" indent="-514350">
-              <a:buFont typeface="+mj-lt"/>
-              <a:buAutoNum type="arabicPeriod"/>
-            </a:pPr>
-            <a:r>
-              <a:rPr lang="en-US" dirty="0"/>
-              <a:t>Use </a:t>
-            </a:r>
+              <a:t>pwd</a:t>
+            </a:r>
+            <a:r>
+              <a:rPr lang="en-US" dirty="0"/>
+              <a:t> : print present working directory</a:t>
+            </a:r>
+          </a:p>
+          <a:p>
             <a:r>
               <a:rPr lang="en-US" dirty="0" err="1"/>
-              <a:t>pscp</a:t>
-            </a:r>
-            <a:r>
-              <a:rPr lang="en-US" dirty="0"/>
-              <a:t> / </a:t>
+              <a:t>cp</a:t>
+            </a:r>
+            <a:r>
+              <a:rPr lang="en-US" dirty="0"/>
+              <a:t> &lt;file&gt; &lt;</a:t>
             </a:r>
             <a:r>
               <a:rPr lang="en-US" dirty="0" err="1"/>
-              <a:t>winSCP</a:t>
-            </a:r>
-            <a:endParaRPr lang="en-US" dirty="0"/>
-          </a:p>
-          <a:p>
-            <a:pPr marL="457200" lvl="1" indent="0">
-              <a:buNone/>
-            </a:pPr>
-            <a:endParaRPr lang="en-US" dirty="0"/>
-          </a:p>
-          <a:p>
-            <a:r>
-              <a:rPr lang="en-US" dirty="0"/>
-              <a:t>Use Putty to log into </a:t>
-            </a:r>
+              <a:t>new_file</a:t>
+            </a:r>
+            <a:r>
+              <a:rPr lang="en-US" dirty="0"/>
+              <a:t>&gt; : copy</a:t>
+            </a:r>
+          </a:p>
+          <a:p>
             <a:r>
               <a:rPr lang="en-US" dirty="0" err="1"/>
-              <a:t>SEASnet</a:t>
-            </a:r>
-            <a:r>
-              <a:rPr lang="en-US" dirty="0"/>
-              <a:t> machine (Step #3 on website)</a:t>
-            </a:r>
-          </a:p>
-          <a:p>
-            <a:r>
-              <a:rPr lang="en-US" dirty="0"/>
-              <a:t>Once you log in, you are in a </a:t>
-            </a:r>
+              <a:t>rm</a:t>
+            </a:r>
+            <a:r>
+              <a:rPr lang="en-US" dirty="0"/>
+              <a:t> &lt;file&gt; : remove file</a:t>
+            </a:r>
+          </a:p>
+          <a:p>
             <a:r>
               <a:rPr lang="en-US" dirty="0" err="1"/>
-              <a:t>linux</a:t>
-            </a:r>
-            <a:r>
-              <a:rPr lang="en-US" dirty="0"/>
-              <a:t> environment (same instructions as previous slide after the </a:t>
-            </a:r>
+              <a:t>rm</a:t>
+            </a:r>
+            <a:r>
+              <a:rPr lang="en-US" dirty="0"/>
+              <a:t> –r &lt;</a:t>
+            </a:r>
+            <a:r>
+              <a:rPr lang="en-US" dirty="0" err="1"/>
+              <a:t>dir</a:t>
+            </a:r>
+            <a:r>
+              <a:rPr lang="en-US" dirty="0"/>
+              <a:t>&gt; : remove directory</a:t>
+            </a:r>
+          </a:p>
+          <a:p>
+            <a:r>
+              <a:rPr lang="en-US" dirty="0" err="1"/>
+              <a:t>mkdir</a:t>
+            </a:r>
+            <a:r>
+              <a:rPr lang="en-US" dirty="0"/>
+              <a:t> &lt;</a:t>
+            </a:r>
+            <a:r>
+              <a:rPr lang="en-US" dirty="0" err="1"/>
+              <a:t>dir</a:t>
+            </a:r>
+            <a:r>
+              <a:rPr lang="en-US" dirty="0"/>
+              <a:t>&gt; : make directory</a:t>
+            </a:r>
+          </a:p>
+          <a:p>
             <a:r>
               <a:rPr lang="en-US" dirty="0" err="1"/>
               <a:t>ssh</a:t>
             </a:r>
             <a:r>
               <a:rPr lang="en-US" dirty="0"/>
-              <a:t> command.)</a:t>
+              <a:t> &lt;username&gt;@cs31.seas.ucla.edu : login to remote server</a:t>
+            </a:r>
+          </a:p>
+          <a:p>
+            <a:r>
+              <a:rPr lang="en-US" dirty="0" err="1"/>
+              <a:t>scp</a:t>
+            </a:r>
+            <a:r>
+              <a:rPr lang="en-US" dirty="0"/>
+              <a:t> &lt;</a:t>
+            </a:r>
+            <a:r>
+              <a:rPr lang="en-US" dirty="0" err="1"/>
+              <a:t>local_file</a:t>
+            </a:r>
+            <a:r>
+              <a:rPr lang="en-US" dirty="0"/>
+              <a:t>&gt; &lt;username&gt;@cs31.seas.ucla.edu:&lt;</a:t>
+            </a:r>
+            <a:r>
+              <a:rPr lang="en-US" dirty="0" err="1"/>
+              <a:t>file_copy_location</a:t>
+            </a:r>
+            <a:r>
+              <a:rPr lang="en-US" dirty="0"/>
+              <a:t>&gt;</a:t>
+            </a:r>
+          </a:p>
+          <a:p>
+            <a:pPr lvl="1"/>
+            <a:r>
+              <a:rPr lang="en-US" dirty="0"/>
+              <a:t>Use this command to transfer a file to the remote server</a:t>
+            </a:r>
+          </a:p>
+          <a:p>
+            <a:pPr lvl="1"/>
+            <a:r>
+              <a:rPr lang="en-US" dirty="0"/>
+              <a:t>Replace &lt;</a:t>
+            </a:r>
+            <a:r>
+              <a:rPr lang="en-US" dirty="0" err="1"/>
+              <a:t>local_file</a:t>
+            </a:r>
+            <a:r>
+              <a:rPr lang="en-US" dirty="0"/>
+              <a:t>&gt; with the location of your file</a:t>
+            </a:r>
+          </a:p>
+          <a:p>
+            <a:pPr lvl="1"/>
+            <a:r>
+              <a:rPr lang="en-US" dirty="0"/>
+              <a:t>Replace &lt;username&gt; with your username</a:t>
+            </a:r>
+          </a:p>
+          <a:p>
+            <a:pPr lvl="1"/>
+            <a:r>
+              <a:rPr lang="en-US" dirty="0"/>
+              <a:t>Replace &lt;</a:t>
+            </a:r>
+            <a:r>
+              <a:rPr lang="en-US" dirty="0" err="1"/>
+              <a:t>file_copy_location</a:t>
+            </a:r>
+            <a:r>
+              <a:rPr lang="en-US" dirty="0"/>
+              <a:t>&gt; with the place you want to put the file on seas</a:t>
             </a:r>
           </a:p>
         </p:txBody>
@@ -5626,7 +6133,7 @@
     </p:spTree>
     <p:extLst>
       <p:ext uri="{BB962C8B-B14F-4D97-AF65-F5344CB8AC3E}">
-        <p14:creationId xmlns:p14="http://schemas.microsoft.com/office/powerpoint/2010/main" val="548014778"/>
+        <p14:creationId xmlns:p14="http://schemas.microsoft.com/office/powerpoint/2010/main" val="1098934328"/>
       </p:ext>
     </p:extLst>
   </p:cSld>
@@ -5658,7 +6165,7 @@
           <p:cNvPr id="2" name="Title 1">
             <a:extLst>
               <a:ext uri="{FF2B5EF4-FFF2-40B4-BE49-F238E27FC236}">
-                <a16:creationId xmlns:a16="http://schemas.microsoft.com/office/drawing/2014/main" id="{DC9E4C4E-4350-494C-8010-0AA2202891EE}"/>
+                <a16:creationId xmlns:a16="http://schemas.microsoft.com/office/drawing/2014/main" id="{1294B6AA-4398-184B-BCB8-A393AB4164DB}"/>
               </a:ext>
             </a:extLst>
           </p:cNvPr>
@@ -5676,7 +6183,7 @@
           <a:p>
             <a:r>
               <a:rPr lang="en-US" dirty="0"/>
-              <a:t>Common bash commands</a:t>
+              <a:t>Compiling projects/homework </a:t>
             </a:r>
           </a:p>
         </p:txBody>
@@ -5686,7 +6193,7 @@
           <p:cNvPr id="3" name="Content Placeholder 2">
             <a:extLst>
               <a:ext uri="{FF2B5EF4-FFF2-40B4-BE49-F238E27FC236}">
-                <a16:creationId xmlns:a16="http://schemas.microsoft.com/office/drawing/2014/main" id="{73CC3875-F550-B04F-902C-1E8E0E824E11}"/>
+                <a16:creationId xmlns:a16="http://schemas.microsoft.com/office/drawing/2014/main" id="{D2220137-DE35-304B-8D77-0F2B1C94426C}"/>
               </a:ext>
             </a:extLst>
           </p:cNvPr>
@@ -5699,100 +6206,97 @@
         </p:nvSpPr>
         <p:spPr/>
         <p:txBody>
-          <a:bodyPr/>
-          <a:lstStyle/>
-          <a:p>
-            <a:r>
-              <a:rPr lang="en-US" dirty="0"/>
-              <a:t>ls : show all files in directory</a:t>
-            </a:r>
-          </a:p>
-          <a:p>
-            <a:r>
-              <a:rPr lang="en-US" dirty="0"/>
-              <a:t>cd &lt;</a:t>
+          <a:bodyPr>
+            <a:normAutofit/>
+          </a:bodyPr>
+          <a:lstStyle/>
+          <a:p>
+            <a:r>
+              <a:rPr lang="en-US" dirty="0"/>
+              <a:t>First copy your code to seas and login using </a:t>
             </a:r>
             <a:r>
               <a:rPr lang="en-US" dirty="0" err="1"/>
-              <a:t>new_dir</a:t>
-            </a:r>
-            <a:r>
-              <a:rPr lang="en-US" dirty="0"/>
-              <a:t>&gt; : change directory</a:t>
-            </a:r>
-          </a:p>
-          <a:p>
+              <a:t>ssh</a:t>
+            </a:r>
+            <a:r>
+              <a:rPr lang="en-US" dirty="0"/>
+              <a:t>/Putty</a:t>
+            </a:r>
+          </a:p>
+          <a:p>
+            <a:r>
+              <a:rPr lang="en-US" dirty="0"/>
+              <a:t>How do I check if my code can compile using g31? (replace Jennifer with your own username.  In this example, the </a:t>
+            </a:r>
             <a:r>
               <a:rPr lang="en-US" dirty="0" err="1"/>
-              <a:t>pwd</a:t>
-            </a:r>
-            <a:r>
-              <a:rPr lang="en-US" dirty="0"/>
-              <a:t> : print present working directory</a:t>
-            </a:r>
-          </a:p>
-          <a:p>
+              <a:t>hello.cpp</a:t>
+            </a:r>
+            <a:r>
+              <a:rPr lang="en-US" dirty="0"/>
+              <a:t> file is located in the Desktop folder.)</a:t>
+            </a:r>
+          </a:p>
+          <a:p>
+            <a:pPr marL="457200" lvl="1" indent="0">
+              <a:buNone/>
+            </a:pPr>
+            <a:r>
+              <a:rPr lang="en-US" dirty="0"/>
+              <a:t>ls ~/Desktop</a:t>
+            </a:r>
+          </a:p>
+          <a:p>
+            <a:pPr marL="457200" lvl="1" indent="0">
+              <a:buNone/>
+            </a:pPr>
+            <a:r>
+              <a:rPr lang="en-US" dirty="0"/>
+              <a:t>cd ~/Desktop</a:t>
+            </a:r>
+          </a:p>
+          <a:p>
+            <a:pPr marL="457200" lvl="1" indent="0">
+              <a:buNone/>
+            </a:pPr>
+            <a:r>
+              <a:rPr lang="en-US" dirty="0"/>
+              <a:t>curl -s -L http://</a:t>
+            </a:r>
             <a:r>
               <a:rPr lang="en-US" dirty="0" err="1"/>
-              <a:t>cp</a:t>
-            </a:r>
-            <a:r>
-              <a:rPr lang="en-US" dirty="0"/>
-              <a:t> &lt;file&gt; &lt;</a:t>
+              <a:t>cs.ucla.edu</a:t>
+            </a:r>
+            <a:r>
+              <a:rPr lang="en-US" dirty="0"/>
+              <a:t>/classes/fall18/cs31/Utilities/setupg31 | bash</a:t>
+            </a:r>
+          </a:p>
+          <a:p>
+            <a:pPr marL="457200" lvl="1" indent="0">
+              <a:buNone/>
+            </a:pPr>
+            <a:r>
+              <a:rPr lang="en-US" dirty="0"/>
+              <a:t>g31 </a:t>
             </a:r>
             <a:r>
               <a:rPr lang="en-US" dirty="0" err="1"/>
-              <a:t>new_file</a:t>
-            </a:r>
-            <a:r>
-              <a:rPr lang="en-US" dirty="0"/>
-              <a:t>&gt; : copy</a:t>
-            </a:r>
-          </a:p>
-          <a:p>
-            <a:r>
-              <a:rPr lang="en-US" dirty="0" err="1"/>
-              <a:t>rm</a:t>
-            </a:r>
-            <a:r>
-              <a:rPr lang="en-US" dirty="0"/>
-              <a:t> &lt;file&gt; : remove file</a:t>
-            </a:r>
-          </a:p>
-          <a:p>
-            <a:r>
-              <a:rPr lang="en-US" dirty="0" err="1"/>
-              <a:t>rm</a:t>
-            </a:r>
-            <a:r>
-              <a:rPr lang="en-US" dirty="0"/>
-              <a:t> –r &lt;</a:t>
-            </a:r>
-            <a:r>
-              <a:rPr lang="en-US" dirty="0" err="1"/>
-              <a:t>dir</a:t>
-            </a:r>
-            <a:r>
-              <a:rPr lang="en-US" dirty="0"/>
-              <a:t>&gt; : remove directory</a:t>
-            </a:r>
-          </a:p>
-          <a:p>
-            <a:r>
-              <a:rPr lang="en-US" dirty="0" err="1"/>
-              <a:t>mkdir</a:t>
-            </a:r>
-            <a:r>
-              <a:rPr lang="en-US" dirty="0"/>
-              <a:t> &lt;</a:t>
-            </a:r>
-            <a:r>
-              <a:rPr lang="en-US" dirty="0" err="1"/>
-              <a:t>dir</a:t>
-            </a:r>
-            <a:r>
-              <a:rPr lang="en-US" dirty="0"/>
-              <a:t>&gt; : make directory</a:t>
+              <a:t>hello.cpp</a:t>
+            </a:r>
+            <a:r>
+              <a:rPr lang="en-US" dirty="0"/>
+              <a:t> –o hello</a:t>
+            </a:r>
+          </a:p>
+          <a:p>
+            <a:pPr marL="457200" lvl="1" indent="0">
+              <a:buNone/>
+            </a:pPr>
+            <a:r>
+              <a:rPr lang="en-US" dirty="0"/>
+              <a:t>./hello</a:t>
             </a:r>
           </a:p>
         </p:txBody>
@@ -5800,7 +6304,7 @@
     </p:spTree>
     <p:extLst>
       <p:ext uri="{BB962C8B-B14F-4D97-AF65-F5344CB8AC3E}">
-        <p14:creationId xmlns:p14="http://schemas.microsoft.com/office/powerpoint/2010/main" val="1098934328"/>
+        <p14:creationId xmlns:p14="http://schemas.microsoft.com/office/powerpoint/2010/main" val="3740135673"/>
       </p:ext>
     </p:extLst>
   </p:cSld>
@@ -5832,7 +6336,7 @@
           <p:cNvPr id="2" name="Title 1">
             <a:extLst>
               <a:ext uri="{FF2B5EF4-FFF2-40B4-BE49-F238E27FC236}">
-                <a16:creationId xmlns:a16="http://schemas.microsoft.com/office/drawing/2014/main" id="{B87B10F3-9DF0-A247-866B-20D3F76EE63B}"/>
+                <a16:creationId xmlns:a16="http://schemas.microsoft.com/office/drawing/2014/main" id="{AE397F4C-F246-8E41-8E62-3F654F777ADB}"/>
               </a:ext>
             </a:extLst>
           </p:cNvPr>
@@ -5850,7 +6354,7 @@
           <a:p>
             <a:r>
               <a:rPr lang="en-US" dirty="0"/>
-              <a:t>Tips</a:t>
+              <a:t>DNS Spoofing error</a:t>
             </a:r>
           </a:p>
         </p:txBody>
@@ -5860,7 +6364,7 @@
           <p:cNvPr id="3" name="Content Placeholder 2">
             <a:extLst>
               <a:ext uri="{FF2B5EF4-FFF2-40B4-BE49-F238E27FC236}">
-                <a16:creationId xmlns:a16="http://schemas.microsoft.com/office/drawing/2014/main" id="{83FE603A-BAEC-834C-8B03-F5AA36139B46}"/>
+                <a16:creationId xmlns:a16="http://schemas.microsoft.com/office/drawing/2014/main" id="{20DFA14D-8BF8-894A-84E4-F18982CF0A6C}"/>
               </a:ext>
             </a:extLst>
           </p:cNvPr>
@@ -5878,7 +6382,15 @@
           <a:p>
             <a:r>
               <a:rPr lang="en-US" dirty="0"/>
-              <a:t>Bash alias for </a:t>
+              <a:t>If there is a weird DNS spoofing warning when using </a:t>
+            </a:r>
+            <a:r>
+              <a:rPr lang="en-US" dirty="0" err="1"/>
+              <a:t>scp</a:t>
+            </a:r>
+            <a:r>
+              <a:rPr lang="en-US" dirty="0"/>
+              <a:t> or </a:t>
             </a:r>
             <a:r>
               <a:rPr lang="en-US" dirty="0" err="1"/>
@@ -5886,21 +6398,14 @@
             </a:r>
             <a:r>
               <a:rPr lang="en-US" dirty="0"/>
-              <a:t> to seas. Add the following line to ~/.</a:t>
-            </a:r>
-            <a:r>
-              <a:rPr lang="en-US" dirty="0" err="1"/>
-              <a:t>bash_aliases</a:t>
-            </a:r>
-            <a:endParaRPr lang="en-US" dirty="0"/>
-          </a:p>
-          <a:p>
-            <a:pPr marL="457200" lvl="1" indent="0">
-              <a:buNone/>
-            </a:pPr>
-            <a:r>
-              <a:rPr lang="en-US" dirty="0"/>
-              <a:t>alias cs31="</a:t>
+              <a:t>, try the following</a:t>
+            </a:r>
+          </a:p>
+          <a:p>
+            <a:pPr lvl="1"/>
+            <a:r>
+              <a:rPr lang="en-US" dirty="0"/>
+              <a:t> </a:t>
             </a:r>
             <a:r>
               <a:rPr lang="en-US" dirty="0" err="1"/>
@@ -5908,52 +6413,77 @@
             </a:r>
             <a:r>
               <a:rPr lang="en-US" dirty="0"/>
-              <a:t> &lt;username&gt;@cs31.seas.ucla.edu”</a:t>
-            </a:r>
-          </a:p>
-          <a:p>
-            <a:pPr marL="457200" lvl="1" indent="0">
-              <a:buNone/>
-            </a:pPr>
-            <a:endParaRPr lang="en-US" dirty="0"/>
-          </a:p>
-          <a:p>
-            <a:r>
-              <a:rPr lang="en-US" dirty="0"/>
-              <a:t>If you have multiple errors, correct errors sequentially and re-compile after each one.</a:t>
-            </a:r>
-          </a:p>
-          <a:p>
-            <a:endParaRPr lang="en-US" dirty="0"/>
-          </a:p>
-          <a:p>
-            <a:r>
-              <a:rPr lang="en-US" dirty="0"/>
-              <a:t>Develop incrementally</a:t>
-            </a:r>
-          </a:p>
-          <a:p>
-            <a:pPr marL="0" indent="0">
-              <a:buNone/>
-            </a:pPr>
-            <a:endParaRPr lang="en-US" dirty="0"/>
-          </a:p>
-          <a:p>
-            <a:r>
-              <a:rPr lang="en-US" dirty="0"/>
-              <a:t>Can use script to check filenames and compile before submission</a:t>
-            </a:r>
-          </a:p>
-          <a:p>
-            <a:pPr marL="457200" lvl="1" indent="0">
-              <a:buNone/>
-            </a:pPr>
-            <a:endParaRPr lang="en-US" dirty="0"/>
-          </a:p>
-          <a:p>
-            <a:pPr marL="0" indent="0">
-              <a:buNone/>
-            </a:pPr>
+              <a:t> </a:t>
+            </a:r>
+            <a:r>
+              <a:rPr lang="en-US" i="1" dirty="0"/>
+              <a:t>yourSEASaccount</a:t>
+            </a:r>
+            <a:r>
+              <a:rPr lang="en-US" dirty="0"/>
+              <a:t>@cs31.seas.ucla.edu date </a:t>
+            </a:r>
+          </a:p>
+          <a:p>
+            <a:pPr lvl="2"/>
+            <a:r>
+              <a:rPr lang="en-US" dirty="0"/>
+              <a:t>Afterwards, try the normal </a:t>
+            </a:r>
+            <a:r>
+              <a:rPr lang="en-US" dirty="0" err="1"/>
+              <a:t>ssh</a:t>
+            </a:r>
+            <a:r>
+              <a:rPr lang="en-US" dirty="0"/>
+              <a:t> command without the “date” at the end</a:t>
+            </a:r>
+          </a:p>
+          <a:p>
+            <a:pPr lvl="2"/>
+            <a:r>
+              <a:rPr lang="en-US" dirty="0"/>
+              <a:t>In my experience, this does not seem to work reliably</a:t>
+            </a:r>
+          </a:p>
+          <a:p>
+            <a:pPr lvl="1"/>
+            <a:r>
+              <a:rPr lang="en-US" dirty="0"/>
+              <a:t> Remove line starting with “cs31.seas.ucla.edu….” from ~/.</a:t>
+            </a:r>
+            <a:r>
+              <a:rPr lang="en-US" dirty="0" err="1"/>
+              <a:t>ssh</a:t>
+            </a:r>
+            <a:r>
+              <a:rPr lang="en-US" dirty="0"/>
+              <a:t>/</a:t>
+            </a:r>
+            <a:r>
+              <a:rPr lang="en-US" dirty="0" err="1"/>
+              <a:t>known_hosts</a:t>
+            </a:r>
+            <a:r>
+              <a:rPr lang="en-US" dirty="0"/>
+              <a:t> </a:t>
+            </a:r>
+          </a:p>
+          <a:p>
+            <a:pPr lvl="2"/>
+            <a:r>
+              <a:rPr lang="en-US" dirty="0"/>
+              <a:t>Note: Make sure you actually remove the entire line.  If your window size is too small, a single line may look like it spans multiple lines.  Perhaps use a text editor that uses line numbers.  </a:t>
+            </a:r>
+          </a:p>
+          <a:p>
+            <a:pPr lvl="2"/>
+            <a:r>
+              <a:rPr lang="en-US" dirty="0"/>
+              <a:t>This solution is not ideal, and you may need to do it every time you log in.  I will update this slide when I identify a better solution.</a:t>
+            </a:r>
+          </a:p>
+          <a:p>
             <a:endParaRPr lang="en-US" dirty="0"/>
           </a:p>
         </p:txBody>
@@ -5961,7 +6491,7 @@
     </p:spTree>
     <p:extLst>
       <p:ext uri="{BB962C8B-B14F-4D97-AF65-F5344CB8AC3E}">
-        <p14:creationId xmlns:p14="http://schemas.microsoft.com/office/powerpoint/2010/main" val="3915033385"/>
+        <p14:creationId xmlns:p14="http://schemas.microsoft.com/office/powerpoint/2010/main" val="3670306408"/>
       </p:ext>
     </p:extLst>
   </p:cSld>

</xml_diff>